<commit_message>
labtools poster first draft
</commit_message>
<xml_diff>
--- a/posters/labtoolsposter.pptx
+++ b/posters/labtoolsposter.pptx
@@ -1523,7 +1523,7 @@
         <p:spPr>
           <a:xfrm>
             <a:off x="720" y="0"/>
-            <a:ext cx="42792120" cy="30266640"/>
+            <a:ext cx="42791760" cy="30266280"/>
           </a:xfrm>
           <a:prstGeom prst="rect">
             <a:avLst/>
@@ -1579,7 +1579,7 @@
         <p:spPr>
           <a:xfrm>
             <a:off x="967320" y="298800"/>
-            <a:ext cx="29119680" cy="2482200"/>
+            <a:ext cx="29119320" cy="2481840"/>
           </a:xfrm>
           <a:prstGeom prst="rect">
             <a:avLst/>
@@ -1614,6 +1614,7 @@
                   </a:solidFill>
                 </a:uFill>
                 <a:latin typeface="Calibri"/>
+                <a:ea typeface="DejaVu Sans"/>
               </a:rPr>
               <a:t>Lab Authoring Tools</a:t>
             </a:r>
@@ -1639,8 +1640,8 @@
         </p:nvSpPr>
         <p:spPr>
           <a:xfrm>
-            <a:off x="1081440" y="4495320"/>
-            <a:ext cx="10976400" cy="19408320"/>
+            <a:off x="936000" y="11354040"/>
+            <a:ext cx="10976040" cy="12454920"/>
           </a:xfrm>
           <a:prstGeom prst="rect">
             <a:avLst/>
@@ -1692,8 +1693,8 @@
         </p:nvSpPr>
         <p:spPr>
           <a:xfrm>
-            <a:off x="1577160" y="4947840"/>
-            <a:ext cx="8214480" cy="15949800"/>
+            <a:off x="1431720" y="11697840"/>
+            <a:ext cx="9740880" cy="12111120"/>
           </a:xfrm>
           <a:prstGeom prst="rect">
             <a:avLst/>
@@ -1824,7 +1825,7 @@
         <p:spPr>
           <a:xfrm>
             <a:off x="12592440" y="4495320"/>
-            <a:ext cx="10976400" cy="22038120"/>
+            <a:ext cx="10976040" cy="22037760"/>
           </a:xfrm>
           <a:prstGeom prst="rect">
             <a:avLst/>
@@ -1876,8 +1877,8 @@
         </p:nvSpPr>
         <p:spPr>
           <a:xfrm>
-            <a:off x="24141600" y="4458960"/>
-            <a:ext cx="17532360" cy="7015680"/>
+            <a:off x="1080000" y="3816000"/>
+            <a:ext cx="10584000" cy="7538040"/>
           </a:xfrm>
           <a:prstGeom prst="rect">
             <a:avLst/>
@@ -1930,7 +1931,7 @@
         <p:spPr>
           <a:xfrm>
             <a:off x="24141600" y="10711080"/>
-            <a:ext cx="17532360" cy="7015680"/>
+            <a:ext cx="17532000" cy="7015320"/>
           </a:xfrm>
           <a:prstGeom prst="rect">
             <a:avLst/>
@@ -1983,7 +1984,7 @@
         <p:spPr>
           <a:xfrm>
             <a:off x="24141600" y="17421120"/>
-            <a:ext cx="17532360" cy="7015680"/>
+            <a:ext cx="17532000" cy="7015320"/>
           </a:xfrm>
           <a:prstGeom prst="rect">
             <a:avLst/>
@@ -2036,7 +2037,7 @@
         <p:spPr>
           <a:xfrm>
             <a:off x="13202280" y="4947840"/>
-            <a:ext cx="8253720" cy="9231120"/>
+            <a:ext cx="8253360" cy="9230760"/>
           </a:xfrm>
           <a:prstGeom prst="rect">
             <a:avLst/>
@@ -2181,8 +2182,8 @@
         </p:nvSpPr>
         <p:spPr>
           <a:xfrm>
-            <a:off x="24598800" y="4947840"/>
-            <a:ext cx="15550560" cy="5712840"/>
+            <a:off x="1537200" y="4304880"/>
+            <a:ext cx="9694800" cy="5712480"/>
           </a:xfrm>
           <a:prstGeom prst="rect">
             <a:avLst/>
@@ -2317,7 +2318,7 @@
         <p:spPr>
           <a:xfrm>
             <a:off x="11244600" y="15642720"/>
-            <a:ext cx="13559040" cy="10169280"/>
+            <a:ext cx="13558680" cy="10168920"/>
           </a:xfrm>
           <a:prstGeom prst="rect">
             <a:avLst/>
@@ -2336,7 +2337,7 @@
         <p:spPr>
           <a:xfrm>
             <a:off x="24598800" y="11161800"/>
-            <a:ext cx="15550560" cy="5575320"/>
+            <a:ext cx="15550200" cy="5574960"/>
           </a:xfrm>
           <a:prstGeom prst="rect">
             <a:avLst/>
@@ -2482,7 +2483,7 @@
         <p:spPr>
           <a:xfrm>
             <a:off x="24598800" y="17948160"/>
-            <a:ext cx="15550560" cy="6168960"/>
+            <a:ext cx="15550200" cy="6168600"/>
           </a:xfrm>
           <a:prstGeom prst="rect">
             <a:avLst/>
@@ -2628,7 +2629,7 @@
         <p:spPr>
           <a:xfrm>
             <a:off x="29325240" y="25952040"/>
-            <a:ext cx="11586240" cy="716400"/>
+            <a:ext cx="11585880" cy="716040"/>
           </a:xfrm>
           <a:prstGeom prst="rect">
             <a:avLst/>
@@ -2694,7 +2695,30 @@
         <p:spPr>
           <a:xfrm>
             <a:off x="24750360" y="24741000"/>
-            <a:ext cx="4421880" cy="2954880"/>
+            <a:ext cx="4421520" cy="2954520"/>
+          </a:xfrm>
+          <a:prstGeom prst="rect">
+            <a:avLst/>
+          </a:prstGeom>
+          <a:ln>
+            <a:noFill/>
+          </a:ln>
+        </p:spPr>
+      </p:pic>
+      <p:pic>
+        <p:nvPicPr>
+          <p:cNvPr id="49" name="" descr=""/>
+          <p:cNvPicPr/>
+          <p:nvPr/>
+        </p:nvPicPr>
+        <p:blipFill>
+          <a:blip r:embed="rId3"/>
+          <a:stretch/>
+        </p:blipFill>
+        <p:spPr>
+          <a:xfrm>
+            <a:off x="25829640" y="4450320"/>
+            <a:ext cx="14130360" cy="5643000"/>
           </a:xfrm>
           <a:prstGeom prst="rect">
             <a:avLst/>

</xml_diff>

<commit_message>
web security and labtools posters
</commit_message>
<xml_diff>
--- a/posters/labtoolsposter.pptx
+++ b/posters/labtoolsposter.pptx
@@ -53,7 +53,7 @@
       </p:grpSpPr>
       <p:sp>
         <p:nvSpPr>
-          <p:cNvPr id="22" name="PlaceHolder 1"/>
+          <p:cNvPr id="24" name="PlaceHolder 1"/>
           <p:cNvSpPr>
             <a:spLocks noGrp="1"/>
           </p:cNvSpPr>
@@ -90,7 +90,7 @@
       </p:sp>
       <p:sp>
         <p:nvSpPr>
-          <p:cNvPr id="23" name="PlaceHolder 2"/>
+          <p:cNvPr id="25" name="PlaceHolder 2"/>
           <p:cNvSpPr>
             <a:spLocks noGrp="1"/>
           </p:cNvSpPr>
@@ -126,7 +126,7 @@
       </p:sp>
       <p:sp>
         <p:nvSpPr>
-          <p:cNvPr id="24" name="PlaceHolder 3"/>
+          <p:cNvPr id="26" name="PlaceHolder 3"/>
           <p:cNvSpPr>
             <a:spLocks noGrp="1"/>
           </p:cNvSpPr>
@@ -184,7 +184,7 @@
       </p:grpSpPr>
       <p:sp>
         <p:nvSpPr>
-          <p:cNvPr id="25" name="PlaceHolder 1"/>
+          <p:cNvPr id="27" name="PlaceHolder 1"/>
           <p:cNvSpPr>
             <a:spLocks noGrp="1"/>
           </p:cNvSpPr>
@@ -221,7 +221,7 @@
       </p:sp>
       <p:sp>
         <p:nvSpPr>
-          <p:cNvPr id="26" name="PlaceHolder 2"/>
+          <p:cNvPr id="28" name="PlaceHolder 2"/>
           <p:cNvSpPr>
             <a:spLocks noGrp="1"/>
           </p:cNvSpPr>
@@ -257,7 +257,7 @@
       </p:sp>
       <p:sp>
         <p:nvSpPr>
-          <p:cNvPr id="27" name="PlaceHolder 3"/>
+          <p:cNvPr id="29" name="PlaceHolder 3"/>
           <p:cNvSpPr>
             <a:spLocks noGrp="1"/>
           </p:cNvSpPr>
@@ -293,7 +293,7 @@
       </p:sp>
       <p:sp>
         <p:nvSpPr>
-          <p:cNvPr id="28" name="PlaceHolder 4"/>
+          <p:cNvPr id="30" name="PlaceHolder 4"/>
           <p:cNvSpPr>
             <a:spLocks noGrp="1"/>
           </p:cNvSpPr>
@@ -329,7 +329,7 @@
       </p:sp>
       <p:sp>
         <p:nvSpPr>
-          <p:cNvPr id="29" name="PlaceHolder 5"/>
+          <p:cNvPr id="31" name="PlaceHolder 5"/>
           <p:cNvSpPr>
             <a:spLocks noGrp="1"/>
           </p:cNvSpPr>
@@ -387,7 +387,7 @@
       </p:grpSpPr>
       <p:sp>
         <p:nvSpPr>
-          <p:cNvPr id="30" name="PlaceHolder 1"/>
+          <p:cNvPr id="32" name="PlaceHolder 1"/>
           <p:cNvSpPr>
             <a:spLocks noGrp="1"/>
           </p:cNvSpPr>
@@ -424,7 +424,7 @@
       </p:sp>
       <p:sp>
         <p:nvSpPr>
-          <p:cNvPr id="31" name="PlaceHolder 2"/>
+          <p:cNvPr id="33" name="PlaceHolder 2"/>
           <p:cNvSpPr>
             <a:spLocks noGrp="1"/>
           </p:cNvSpPr>
@@ -460,7 +460,7 @@
       </p:sp>
       <p:sp>
         <p:nvSpPr>
-          <p:cNvPr id="32" name="PlaceHolder 3"/>
+          <p:cNvPr id="34" name="PlaceHolder 3"/>
           <p:cNvSpPr>
             <a:spLocks noGrp="1"/>
           </p:cNvSpPr>
@@ -496,7 +496,7 @@
       </p:sp>
       <p:pic>
         <p:nvPicPr>
-          <p:cNvPr id="33" name="" descr=""/>
+          <p:cNvPr id="35" name="" descr=""/>
           <p:cNvPicPr/>
           <p:nvPr/>
         </p:nvPicPr>
@@ -519,7 +519,7 @@
       </p:pic>
       <p:pic>
         <p:nvPicPr>
-          <p:cNvPr id="34" name="" descr=""/>
+          <p:cNvPr id="36" name="" descr=""/>
           <p:cNvPicPr/>
           <p:nvPr/>
         </p:nvPicPr>
@@ -564,7 +564,7 @@
       </p:grpSpPr>
       <p:sp>
         <p:nvSpPr>
-          <p:cNvPr id="1" name="PlaceHolder 1"/>
+          <p:cNvPr id="3" name="PlaceHolder 1"/>
           <p:cNvSpPr>
             <a:spLocks noGrp="1"/>
           </p:cNvSpPr>
@@ -601,7 +601,7 @@
       </p:sp>
       <p:sp>
         <p:nvSpPr>
-          <p:cNvPr id="2" name="PlaceHolder 2"/>
+          <p:cNvPr id="4" name="PlaceHolder 2"/>
           <p:cNvSpPr>
             <a:spLocks noGrp="1"/>
           </p:cNvSpPr>
@@ -660,7 +660,7 @@
       </p:grpSpPr>
       <p:sp>
         <p:nvSpPr>
-          <p:cNvPr id="3" name="PlaceHolder 1"/>
+          <p:cNvPr id="5" name="PlaceHolder 1"/>
           <p:cNvSpPr>
             <a:spLocks noGrp="1"/>
           </p:cNvSpPr>
@@ -697,7 +697,7 @@
       </p:sp>
       <p:sp>
         <p:nvSpPr>
-          <p:cNvPr id="4" name="PlaceHolder 2"/>
+          <p:cNvPr id="6" name="PlaceHolder 2"/>
           <p:cNvSpPr>
             <a:spLocks noGrp="1"/>
           </p:cNvSpPr>
@@ -755,7 +755,7 @@
       </p:grpSpPr>
       <p:sp>
         <p:nvSpPr>
-          <p:cNvPr id="5" name="PlaceHolder 1"/>
+          <p:cNvPr id="7" name="PlaceHolder 1"/>
           <p:cNvSpPr>
             <a:spLocks noGrp="1"/>
           </p:cNvSpPr>
@@ -792,7 +792,7 @@
       </p:sp>
       <p:sp>
         <p:nvSpPr>
-          <p:cNvPr id="6" name="PlaceHolder 2"/>
+          <p:cNvPr id="8" name="PlaceHolder 2"/>
           <p:cNvSpPr>
             <a:spLocks noGrp="1"/>
           </p:cNvSpPr>
@@ -828,7 +828,7 @@
       </p:sp>
       <p:sp>
         <p:nvSpPr>
-          <p:cNvPr id="7" name="PlaceHolder 3"/>
+          <p:cNvPr id="9" name="PlaceHolder 3"/>
           <p:cNvSpPr>
             <a:spLocks noGrp="1"/>
           </p:cNvSpPr>
@@ -886,7 +886,7 @@
       </p:grpSpPr>
       <p:sp>
         <p:nvSpPr>
-          <p:cNvPr id="8" name="PlaceHolder 1"/>
+          <p:cNvPr id="10" name="PlaceHolder 1"/>
           <p:cNvSpPr>
             <a:spLocks noGrp="1"/>
           </p:cNvSpPr>
@@ -945,7 +945,7 @@
       </p:grpSpPr>
       <p:sp>
         <p:nvSpPr>
-          <p:cNvPr id="9" name="PlaceHolder 1"/>
+          <p:cNvPr id="11" name="PlaceHolder 1"/>
           <p:cNvSpPr>
             <a:spLocks noGrp="1"/>
           </p:cNvSpPr>
@@ -1004,7 +1004,7 @@
       </p:grpSpPr>
       <p:sp>
         <p:nvSpPr>
-          <p:cNvPr id="10" name="PlaceHolder 1"/>
+          <p:cNvPr id="12" name="PlaceHolder 1"/>
           <p:cNvSpPr>
             <a:spLocks noGrp="1"/>
           </p:cNvSpPr>
@@ -1041,7 +1041,7 @@
       </p:sp>
       <p:sp>
         <p:nvSpPr>
-          <p:cNvPr id="11" name="PlaceHolder 2"/>
+          <p:cNvPr id="13" name="PlaceHolder 2"/>
           <p:cNvSpPr>
             <a:spLocks noGrp="1"/>
           </p:cNvSpPr>
@@ -1077,7 +1077,7 @@
       </p:sp>
       <p:sp>
         <p:nvSpPr>
-          <p:cNvPr id="12" name="PlaceHolder 3"/>
+          <p:cNvPr id="14" name="PlaceHolder 3"/>
           <p:cNvSpPr>
             <a:spLocks noGrp="1"/>
           </p:cNvSpPr>
@@ -1113,7 +1113,7 @@
       </p:sp>
       <p:sp>
         <p:nvSpPr>
-          <p:cNvPr id="13" name="PlaceHolder 4"/>
+          <p:cNvPr id="15" name="PlaceHolder 4"/>
           <p:cNvSpPr>
             <a:spLocks noGrp="1"/>
           </p:cNvSpPr>
@@ -1171,7 +1171,7 @@
       </p:grpSpPr>
       <p:sp>
         <p:nvSpPr>
-          <p:cNvPr id="14" name="PlaceHolder 1"/>
+          <p:cNvPr id="16" name="PlaceHolder 1"/>
           <p:cNvSpPr>
             <a:spLocks noGrp="1"/>
           </p:cNvSpPr>
@@ -1208,7 +1208,7 @@
       </p:sp>
       <p:sp>
         <p:nvSpPr>
-          <p:cNvPr id="15" name="PlaceHolder 2"/>
+          <p:cNvPr id="17" name="PlaceHolder 2"/>
           <p:cNvSpPr>
             <a:spLocks noGrp="1"/>
           </p:cNvSpPr>
@@ -1244,7 +1244,7 @@
       </p:sp>
       <p:sp>
         <p:nvSpPr>
-          <p:cNvPr id="16" name="PlaceHolder 3"/>
+          <p:cNvPr id="18" name="PlaceHolder 3"/>
           <p:cNvSpPr>
             <a:spLocks noGrp="1"/>
           </p:cNvSpPr>
@@ -1280,7 +1280,7 @@
       </p:sp>
       <p:sp>
         <p:nvSpPr>
-          <p:cNvPr id="17" name="PlaceHolder 4"/>
+          <p:cNvPr id="19" name="PlaceHolder 4"/>
           <p:cNvSpPr>
             <a:spLocks noGrp="1"/>
           </p:cNvSpPr>
@@ -1338,7 +1338,7 @@
       </p:grpSpPr>
       <p:sp>
         <p:nvSpPr>
-          <p:cNvPr id="18" name="PlaceHolder 1"/>
+          <p:cNvPr id="20" name="PlaceHolder 1"/>
           <p:cNvSpPr>
             <a:spLocks noGrp="1"/>
           </p:cNvSpPr>
@@ -1375,7 +1375,7 @@
       </p:sp>
       <p:sp>
         <p:nvSpPr>
-          <p:cNvPr id="19" name="PlaceHolder 2"/>
+          <p:cNvPr id="21" name="PlaceHolder 2"/>
           <p:cNvSpPr>
             <a:spLocks noGrp="1"/>
           </p:cNvSpPr>
@@ -1411,7 +1411,7 @@
       </p:sp>
       <p:sp>
         <p:nvSpPr>
-          <p:cNvPr id="20" name="PlaceHolder 3"/>
+          <p:cNvPr id="22" name="PlaceHolder 3"/>
           <p:cNvSpPr>
             <a:spLocks noGrp="1"/>
           </p:cNvSpPr>
@@ -1447,7 +1447,7 @@
       </p:sp>
       <p:sp>
         <p:nvSpPr>
-          <p:cNvPr id="21" name="PlaceHolder 4"/>
+          <p:cNvPr id="23" name="PlaceHolder 4"/>
           <p:cNvSpPr>
             <a:spLocks noGrp="1"/>
           </p:cNvSpPr>
@@ -1523,7 +1523,7 @@
         <p:spPr>
           <a:xfrm>
             <a:off x="720" y="0"/>
-            <a:ext cx="42791760" cy="30266280"/>
+            <a:ext cx="42791400" cy="30265920"/>
           </a:xfrm>
           <a:prstGeom prst="rect">
             <a:avLst/>
@@ -1533,6 +1533,325 @@
           </a:ln>
         </p:spPr>
       </p:pic>
+      <p:sp>
+        <p:nvSpPr>
+          <p:cNvPr id="1" name="PlaceHolder 1"/>
+          <p:cNvSpPr>
+            <a:spLocks noGrp="1"/>
+          </p:cNvSpPr>
+          <p:nvPr>
+            <p:ph type="title"/>
+          </p:nvPr>
+        </p:nvSpPr>
+        <p:spPr>
+          <a:xfrm>
+            <a:off x="2139480" y="1207440"/>
+            <a:ext cx="38514240" cy="5054040"/>
+          </a:xfrm>
+          <a:prstGeom prst="rect">
+            <a:avLst/>
+          </a:prstGeom>
+        </p:spPr>
+        <p:txBody>
+          <a:bodyPr lIns="0" rIns="0" tIns="0" bIns="0" anchor="ctr"/>
+          <a:p>
+            <a:pPr algn="ctr"/>
+            <a:r>
+              <a:rPr b="0" lang="en-IN" sz="4400" spc="-1" strike="noStrike">
+                <a:solidFill>
+                  <a:srgbClr val="000000"/>
+                </a:solidFill>
+                <a:uFill>
+                  <a:solidFill>
+                    <a:srgbClr val="ffffff"/>
+                  </a:solidFill>
+                </a:uFill>
+                <a:latin typeface="Arial"/>
+              </a:rPr>
+              <a:t>Click to edit the title text format</a:t>
+            </a:r>
+            <a:endParaRPr b="0" lang="en-IN" sz="4400" spc="-1" strike="noStrike">
+              <a:solidFill>
+                <a:srgbClr val="000000"/>
+              </a:solidFill>
+              <a:uFill>
+                <a:solidFill>
+                  <a:srgbClr val="ffffff"/>
+                </a:solidFill>
+              </a:uFill>
+              <a:latin typeface="Arial"/>
+            </a:endParaRPr>
+          </a:p>
+        </p:txBody>
+      </p:sp>
+      <p:sp>
+        <p:nvSpPr>
+          <p:cNvPr id="2" name="PlaceHolder 2"/>
+          <p:cNvSpPr>
+            <a:spLocks noGrp="1"/>
+          </p:cNvSpPr>
+          <p:nvPr>
+            <p:ph type="body"/>
+          </p:nvPr>
+        </p:nvSpPr>
+        <p:spPr>
+          <a:xfrm>
+            <a:off x="2139480" y="7082280"/>
+            <a:ext cx="38514240" cy="17554680"/>
+          </a:xfrm>
+          <a:prstGeom prst="rect">
+            <a:avLst/>
+          </a:prstGeom>
+        </p:spPr>
+        <p:txBody>
+          <a:bodyPr lIns="0" rIns="0" tIns="0" bIns="0"/>
+          <a:p>
+            <a:pPr marL="432000" indent="-324000">
+              <a:buClr>
+                <a:srgbClr val="000000"/>
+              </a:buClr>
+              <a:buSzPct val="45000"/>
+              <a:buFont typeface="Wingdings" charset="2"/>
+              <a:buChar char=""/>
+            </a:pPr>
+            <a:r>
+              <a:rPr b="0" lang="en-IN" sz="3200" spc="-1" strike="noStrike">
+                <a:solidFill>
+                  <a:srgbClr val="000000"/>
+                </a:solidFill>
+                <a:uFill>
+                  <a:solidFill>
+                    <a:srgbClr val="ffffff"/>
+                  </a:solidFill>
+                </a:uFill>
+                <a:latin typeface="Arial"/>
+              </a:rPr>
+              <a:t>Click to edit the outline text format</a:t>
+            </a:r>
+            <a:endParaRPr b="0" lang="en-IN" sz="3200" spc="-1" strike="noStrike">
+              <a:solidFill>
+                <a:srgbClr val="000000"/>
+              </a:solidFill>
+              <a:uFill>
+                <a:solidFill>
+                  <a:srgbClr val="ffffff"/>
+                </a:solidFill>
+              </a:uFill>
+              <a:latin typeface="Arial"/>
+            </a:endParaRPr>
+          </a:p>
+          <a:p>
+            <a:pPr lvl="1" marL="864000" indent="-324000">
+              <a:buClr>
+                <a:srgbClr val="000000"/>
+              </a:buClr>
+              <a:buSzPct val="75000"/>
+              <a:buFont typeface="Symbol" charset="2"/>
+              <a:buChar char=""/>
+            </a:pPr>
+            <a:r>
+              <a:rPr b="0" lang="en-IN" sz="2800" spc="-1" strike="noStrike">
+                <a:solidFill>
+                  <a:srgbClr val="000000"/>
+                </a:solidFill>
+                <a:uFill>
+                  <a:solidFill>
+                    <a:srgbClr val="ffffff"/>
+                  </a:solidFill>
+                </a:uFill>
+                <a:latin typeface="Arial"/>
+              </a:rPr>
+              <a:t>Second Outline Level</a:t>
+            </a:r>
+            <a:endParaRPr b="0" lang="en-IN" sz="2800" spc="-1" strike="noStrike">
+              <a:solidFill>
+                <a:srgbClr val="000000"/>
+              </a:solidFill>
+              <a:uFill>
+                <a:solidFill>
+                  <a:srgbClr val="ffffff"/>
+                </a:solidFill>
+              </a:uFill>
+              <a:latin typeface="Arial"/>
+            </a:endParaRPr>
+          </a:p>
+          <a:p>
+            <a:pPr lvl="2" marL="1296000" indent="-288000">
+              <a:buClr>
+                <a:srgbClr val="000000"/>
+              </a:buClr>
+              <a:buSzPct val="45000"/>
+              <a:buFont typeface="Wingdings" charset="2"/>
+              <a:buChar char=""/>
+            </a:pPr>
+            <a:r>
+              <a:rPr b="0" lang="en-IN" sz="2400" spc="-1" strike="noStrike">
+                <a:solidFill>
+                  <a:srgbClr val="000000"/>
+                </a:solidFill>
+                <a:uFill>
+                  <a:solidFill>
+                    <a:srgbClr val="ffffff"/>
+                  </a:solidFill>
+                </a:uFill>
+                <a:latin typeface="Arial"/>
+              </a:rPr>
+              <a:t>Third Outline Level</a:t>
+            </a:r>
+            <a:endParaRPr b="0" lang="en-IN" sz="2400" spc="-1" strike="noStrike">
+              <a:solidFill>
+                <a:srgbClr val="000000"/>
+              </a:solidFill>
+              <a:uFill>
+                <a:solidFill>
+                  <a:srgbClr val="ffffff"/>
+                </a:solidFill>
+              </a:uFill>
+              <a:latin typeface="Arial"/>
+            </a:endParaRPr>
+          </a:p>
+          <a:p>
+            <a:pPr lvl="3" marL="1728000" indent="-216000">
+              <a:buClr>
+                <a:srgbClr val="000000"/>
+              </a:buClr>
+              <a:buSzPct val="75000"/>
+              <a:buFont typeface="Symbol" charset="2"/>
+              <a:buChar char=""/>
+            </a:pPr>
+            <a:r>
+              <a:rPr b="0" lang="en-IN" sz="2000" spc="-1" strike="noStrike">
+                <a:solidFill>
+                  <a:srgbClr val="000000"/>
+                </a:solidFill>
+                <a:uFill>
+                  <a:solidFill>
+                    <a:srgbClr val="ffffff"/>
+                  </a:solidFill>
+                </a:uFill>
+                <a:latin typeface="Arial"/>
+              </a:rPr>
+              <a:t>Fourth Outline Level</a:t>
+            </a:r>
+            <a:endParaRPr b="0" lang="en-IN" sz="2000" spc="-1" strike="noStrike">
+              <a:solidFill>
+                <a:srgbClr val="000000"/>
+              </a:solidFill>
+              <a:uFill>
+                <a:solidFill>
+                  <a:srgbClr val="ffffff"/>
+                </a:solidFill>
+              </a:uFill>
+              <a:latin typeface="Arial"/>
+            </a:endParaRPr>
+          </a:p>
+          <a:p>
+            <a:pPr lvl="4" marL="2160000" indent="-216000">
+              <a:buClr>
+                <a:srgbClr val="000000"/>
+              </a:buClr>
+              <a:buSzPct val="45000"/>
+              <a:buFont typeface="Wingdings" charset="2"/>
+              <a:buChar char=""/>
+            </a:pPr>
+            <a:r>
+              <a:rPr b="0" lang="en-IN" sz="2000" spc="-1" strike="noStrike">
+                <a:solidFill>
+                  <a:srgbClr val="000000"/>
+                </a:solidFill>
+                <a:uFill>
+                  <a:solidFill>
+                    <a:srgbClr val="ffffff"/>
+                  </a:solidFill>
+                </a:uFill>
+                <a:latin typeface="Arial"/>
+              </a:rPr>
+              <a:t>Fifth Outline Level</a:t>
+            </a:r>
+            <a:endParaRPr b="0" lang="en-IN" sz="2000" spc="-1" strike="noStrike">
+              <a:solidFill>
+                <a:srgbClr val="000000"/>
+              </a:solidFill>
+              <a:uFill>
+                <a:solidFill>
+                  <a:srgbClr val="ffffff"/>
+                </a:solidFill>
+              </a:uFill>
+              <a:latin typeface="Arial"/>
+            </a:endParaRPr>
+          </a:p>
+          <a:p>
+            <a:pPr lvl="5" marL="2592000" indent="-216000">
+              <a:buClr>
+                <a:srgbClr val="000000"/>
+              </a:buClr>
+              <a:buSzPct val="45000"/>
+              <a:buFont typeface="Wingdings" charset="2"/>
+              <a:buChar char=""/>
+            </a:pPr>
+            <a:r>
+              <a:rPr b="0" lang="en-IN" sz="2000" spc="-1" strike="noStrike">
+                <a:solidFill>
+                  <a:srgbClr val="000000"/>
+                </a:solidFill>
+                <a:uFill>
+                  <a:solidFill>
+                    <a:srgbClr val="ffffff"/>
+                  </a:solidFill>
+                </a:uFill>
+                <a:latin typeface="Arial"/>
+              </a:rPr>
+              <a:t>Sixth Outline Level</a:t>
+            </a:r>
+            <a:endParaRPr b="0" lang="en-IN" sz="2000" spc="-1" strike="noStrike">
+              <a:solidFill>
+                <a:srgbClr val="000000"/>
+              </a:solidFill>
+              <a:uFill>
+                <a:solidFill>
+                  <a:srgbClr val="ffffff"/>
+                </a:solidFill>
+              </a:uFill>
+              <a:latin typeface="Arial"/>
+            </a:endParaRPr>
+          </a:p>
+          <a:p>
+            <a:pPr lvl="6" marL="3024000" indent="-216000">
+              <a:buClr>
+                <a:srgbClr val="000000"/>
+              </a:buClr>
+              <a:buSzPct val="45000"/>
+              <a:buFont typeface="Wingdings" charset="2"/>
+              <a:buChar char=""/>
+            </a:pPr>
+            <a:r>
+              <a:rPr b="0" lang="en-IN" sz="2000" spc="-1" strike="noStrike">
+                <a:solidFill>
+                  <a:srgbClr val="000000"/>
+                </a:solidFill>
+                <a:uFill>
+                  <a:solidFill>
+                    <a:srgbClr val="ffffff"/>
+                  </a:solidFill>
+                </a:uFill>
+                <a:latin typeface="Arial"/>
+              </a:rPr>
+              <a:t>Seventh Outline Level</a:t>
+            </a:r>
+            <a:endParaRPr b="0" lang="en-IN" sz="2000" spc="-1" strike="noStrike">
+              <a:solidFill>
+                <a:srgbClr val="000000"/>
+              </a:solidFill>
+              <a:uFill>
+                <a:solidFill>
+                  <a:srgbClr val="ffffff"/>
+                </a:solidFill>
+              </a:uFill>
+              <a:latin typeface="Arial"/>
+            </a:endParaRPr>
+          </a:p>
+        </p:txBody>
+      </p:sp>
     </p:spTree>
   </p:cSld>
   <p:clrMap bg1="lt1" bg2="lt2" tx1="dk1" tx2="dk2" accent1="accent1" accent2="accent2" accent3="accent3" accent4="accent4" accent5="accent5" accent6="accent6" hlink="hlink" folHlink="folHlink"/>
@@ -1572,14 +1891,14 @@
       </p:grpSpPr>
       <p:sp>
         <p:nvSpPr>
-          <p:cNvPr id="35" name="CustomShape 1"/>
+          <p:cNvPr id="37" name="CustomShape 1"/>
           <p:cNvSpPr/>
           <p:nvPr/>
         </p:nvSpPr>
         <p:spPr>
           <a:xfrm>
             <a:off x="967320" y="298800"/>
-            <a:ext cx="29119320" cy="2481840"/>
+            <a:ext cx="29118960" cy="2481480"/>
           </a:xfrm>
           <a:prstGeom prst="rect">
             <a:avLst/>
@@ -1634,14 +1953,14 @@
       </p:sp>
       <p:sp>
         <p:nvSpPr>
-          <p:cNvPr id="36" name="CustomShape 2"/>
+          <p:cNvPr id="38" name="CustomShape 2"/>
           <p:cNvSpPr/>
           <p:nvPr/>
         </p:nvSpPr>
         <p:spPr>
           <a:xfrm>
             <a:off x="936000" y="11354040"/>
-            <a:ext cx="10976040" cy="12454920"/>
+            <a:ext cx="10975680" cy="12454560"/>
           </a:xfrm>
           <a:prstGeom prst="rect">
             <a:avLst/>
@@ -1687,14 +2006,14 @@
       </p:sp>
       <p:sp>
         <p:nvSpPr>
-          <p:cNvPr id="37" name="CustomShape 3"/>
+          <p:cNvPr id="39" name="CustomShape 3"/>
           <p:cNvSpPr/>
           <p:nvPr/>
         </p:nvSpPr>
         <p:spPr>
           <a:xfrm>
             <a:off x="1431720" y="11697840"/>
-            <a:ext cx="9740880" cy="12111120"/>
+            <a:ext cx="9740520" cy="12110760"/>
           </a:xfrm>
           <a:prstGeom prst="rect">
             <a:avLst/>
@@ -1818,14 +2137,14 @@
       </p:sp>
       <p:sp>
         <p:nvSpPr>
-          <p:cNvPr id="38" name="CustomShape 4"/>
+          <p:cNvPr id="40" name="CustomShape 4"/>
           <p:cNvSpPr/>
           <p:nvPr/>
         </p:nvSpPr>
         <p:spPr>
           <a:xfrm>
             <a:off x="12592440" y="4495320"/>
-            <a:ext cx="10976040" cy="22037760"/>
+            <a:ext cx="10975680" cy="21424680"/>
           </a:xfrm>
           <a:prstGeom prst="rect">
             <a:avLst/>
@@ -1871,14 +2190,14 @@
       </p:sp>
       <p:sp>
         <p:nvSpPr>
-          <p:cNvPr id="39" name="CustomShape 5"/>
+          <p:cNvPr id="41" name="CustomShape 5"/>
           <p:cNvSpPr/>
           <p:nvPr/>
         </p:nvSpPr>
         <p:spPr>
           <a:xfrm>
-            <a:off x="1080000" y="3816000"/>
-            <a:ext cx="10584000" cy="7538040"/>
+            <a:off x="936000" y="3816000"/>
+            <a:ext cx="10944000" cy="7537680"/>
           </a:xfrm>
           <a:prstGeom prst="rect">
             <a:avLst/>
@@ -1924,14 +2243,14 @@
       </p:sp>
       <p:sp>
         <p:nvSpPr>
-          <p:cNvPr id="40" name="CustomShape 6"/>
+          <p:cNvPr id="42" name="CustomShape 6"/>
           <p:cNvSpPr/>
           <p:nvPr/>
         </p:nvSpPr>
         <p:spPr>
           <a:xfrm>
             <a:off x="24141600" y="10711080"/>
-            <a:ext cx="17532000" cy="7015320"/>
+            <a:ext cx="17531640" cy="7014960"/>
           </a:xfrm>
           <a:prstGeom prst="rect">
             <a:avLst/>
@@ -1975,16 +2294,39 @@
           <a:fontRef idx="minor"/>
         </p:style>
       </p:sp>
-      <p:sp>
-        <p:nvSpPr>
-          <p:cNvPr id="41" name="CustomShape 7"/>
+      <p:pic>
+        <p:nvPicPr>
+          <p:cNvPr id="43" name="" descr=""/>
+          <p:cNvPicPr/>
+          <p:nvPr/>
+        </p:nvPicPr>
+        <p:blipFill>
+          <a:blip r:embed="rId1"/>
+          <a:stretch/>
+        </p:blipFill>
+        <p:spPr>
+          <a:xfrm>
+            <a:off x="11244600" y="15642720"/>
+            <a:ext cx="13558320" cy="10168560"/>
+          </a:xfrm>
+          <a:prstGeom prst="rect">
+            <a:avLst/>
+          </a:prstGeom>
+          <a:ln>
+            <a:noFill/>
+          </a:ln>
+        </p:spPr>
+      </p:pic>
+      <p:sp>
+        <p:nvSpPr>
+          <p:cNvPr id="44" name="CustomShape 7"/>
           <p:cNvSpPr/>
           <p:nvPr/>
         </p:nvSpPr>
         <p:spPr>
           <a:xfrm>
-            <a:off x="24141600" y="17421120"/>
-            <a:ext cx="17532000" cy="7015320"/>
+            <a:off x="24141600" y="17745120"/>
+            <a:ext cx="17531640" cy="7014960"/>
           </a:xfrm>
           <a:prstGeom prst="rect">
             <a:avLst/>
@@ -2030,14 +2372,14 @@
       </p:sp>
       <p:sp>
         <p:nvSpPr>
-          <p:cNvPr id="42" name="CustomShape 8"/>
+          <p:cNvPr id="45" name="CustomShape 8"/>
           <p:cNvSpPr/>
           <p:nvPr/>
         </p:nvSpPr>
         <p:spPr>
           <a:xfrm>
             <a:off x="13202280" y="4947840"/>
-            <a:ext cx="8253360" cy="9230760"/>
+            <a:ext cx="8253000" cy="9230400"/>
           </a:xfrm>
           <a:prstGeom prst="rect">
             <a:avLst/>
@@ -2176,14 +2518,14 @@
       </p:sp>
       <p:sp>
         <p:nvSpPr>
-          <p:cNvPr id="43" name="CustomShape 9"/>
+          <p:cNvPr id="46" name="CustomShape 9"/>
           <p:cNvSpPr/>
           <p:nvPr/>
         </p:nvSpPr>
         <p:spPr>
           <a:xfrm>
             <a:off x="1537200" y="4304880"/>
-            <a:ext cx="9694800" cy="5712480"/>
+            <a:ext cx="9694440" cy="5712120"/>
           </a:xfrm>
           <a:prstGeom prst="rect">
             <a:avLst/>
@@ -2305,39 +2647,16 @@
           </a:p>
         </p:txBody>
       </p:sp>
-      <p:pic>
-        <p:nvPicPr>
-          <p:cNvPr id="44" name="" descr=""/>
-          <p:cNvPicPr/>
-          <p:nvPr/>
-        </p:nvPicPr>
-        <p:blipFill>
-          <a:blip r:embed="rId1"/>
-          <a:stretch/>
-        </p:blipFill>
-        <p:spPr>
-          <a:xfrm>
-            <a:off x="11244600" y="15642720"/>
-            <a:ext cx="13558680" cy="10168920"/>
-          </a:xfrm>
-          <a:prstGeom prst="rect">
-            <a:avLst/>
-          </a:prstGeom>
-          <a:ln>
-            <a:noFill/>
-          </a:ln>
-        </p:spPr>
-      </p:pic>
-      <p:sp>
-        <p:nvSpPr>
-          <p:cNvPr id="45" name="CustomShape 10"/>
+      <p:sp>
+        <p:nvSpPr>
+          <p:cNvPr id="47" name="CustomShape 10"/>
           <p:cNvSpPr/>
           <p:nvPr/>
         </p:nvSpPr>
         <p:spPr>
           <a:xfrm>
             <a:off x="24598800" y="11161800"/>
-            <a:ext cx="15550200" cy="5574960"/>
+            <a:ext cx="15549840" cy="5574600"/>
           </a:xfrm>
           <a:prstGeom prst="rect">
             <a:avLst/>
@@ -2476,14 +2795,14 @@
       </p:sp>
       <p:sp>
         <p:nvSpPr>
-          <p:cNvPr id="46" name="CustomShape 11"/>
+          <p:cNvPr id="48" name="CustomShape 11"/>
           <p:cNvSpPr/>
           <p:nvPr/>
         </p:nvSpPr>
         <p:spPr>
           <a:xfrm>
-            <a:off x="24598800" y="17948160"/>
-            <a:ext cx="15550200" cy="6168600"/>
+            <a:off x="24598800" y="18272160"/>
+            <a:ext cx="15549840" cy="6168240"/>
           </a:xfrm>
           <a:prstGeom prst="rect">
             <a:avLst/>
@@ -2622,14 +2941,14 @@
       </p:sp>
       <p:sp>
         <p:nvSpPr>
-          <p:cNvPr id="47" name="CustomShape 12"/>
+          <p:cNvPr id="49" name="CustomShape 12"/>
           <p:cNvSpPr/>
           <p:nvPr/>
         </p:nvSpPr>
         <p:spPr>
           <a:xfrm>
             <a:off x="29325240" y="25952040"/>
-            <a:ext cx="11585880" cy="716040"/>
+            <a:ext cx="11585520" cy="715680"/>
           </a:xfrm>
           <a:prstGeom prst="rect">
             <a:avLst/>
@@ -2684,7 +3003,7 @@
       </p:sp>
       <p:pic>
         <p:nvPicPr>
-          <p:cNvPr id="48" name="Picture 26" descr=""/>
+          <p:cNvPr id="50" name="Picture 26" descr=""/>
           <p:cNvPicPr/>
           <p:nvPr/>
         </p:nvPicPr>
@@ -2695,7 +3014,7 @@
         <p:spPr>
           <a:xfrm>
             <a:off x="24750360" y="24741000"/>
-            <a:ext cx="4421520" cy="2954520"/>
+            <a:ext cx="4421160" cy="2954160"/>
           </a:xfrm>
           <a:prstGeom prst="rect">
             <a:avLst/>
@@ -2707,7 +3026,7 @@
       </p:pic>
       <p:pic>
         <p:nvPicPr>
-          <p:cNvPr id="49" name="" descr=""/>
+          <p:cNvPr id="51" name="" descr=""/>
           <p:cNvPicPr/>
           <p:nvPr/>
         </p:nvPicPr>
@@ -2717,8 +3036,8 @@
         </p:blipFill>
         <p:spPr>
           <a:xfrm>
-            <a:off x="25829640" y="4450320"/>
-            <a:ext cx="14130360" cy="5643000"/>
+            <a:off x="24856200" y="4248000"/>
+            <a:ext cx="16311600" cy="6519240"/>
           </a:xfrm>
           <a:prstGeom prst="rect">
             <a:avLst/>

</xml_diff>